<commit_message>
strong modification in cars.py
</commit_message>
<xml_diff>
--- a/Results/PhD-Results.pptx
+++ b/Results/PhD-Results.pptx
@@ -7591,6 +7591,23 @@
               </a:rPr>
               <a:t>Irányítás elmélet, Szabályozás elmélet, Vezérlés elmélet, </a:t>
             </a:r>
+            <a:r>
+              <a:rPr lang="en-US" dirty="0">
+                <a:solidFill>
+                  <a:schemeClr val="bg1"/>
+                </a:solidFill>
+                <a:latin typeface="Arial" panose="020B0604020202020204" pitchFamily="34" charset="0"/>
+                <a:cs typeface="Arial" panose="020B0604020202020204" pitchFamily="34" charset="0"/>
+              </a:rPr>
+              <a:t>dynamical system and optimal control.</a:t>
+            </a:r>
+            <a:endParaRPr lang="hu-HU" dirty="0">
+              <a:solidFill>
+                <a:schemeClr val="bg1"/>
+              </a:solidFill>
+              <a:latin typeface="Arial" panose="020B0604020202020204" pitchFamily="34" charset="0"/>
+              <a:cs typeface="Arial" panose="020B0604020202020204" pitchFamily="34" charset="0"/>
+            </a:endParaRPr>
           </a:p>
         </p:txBody>
       </p:sp>
@@ -14436,13 +14453,13 @@
   <p:clrMapOvr>
     <a:masterClrMapping/>
   </p:clrMapOvr>
-  <mc:AlternateContent xmlns:mc="http://schemas.openxmlformats.org/markup-compatibility/2006">
-    <mc:Choice xmlns:p14="http://schemas.microsoft.com/office/powerpoint/2010/main" Requires="p14">
+  <mc:AlternateContent xmlns:mc="http://schemas.openxmlformats.org/markup-compatibility/2006" xmlns:p14="http://schemas.microsoft.com/office/powerpoint/2010/main">
+    <mc:Choice Requires="p14">
       <p:transition spd="med" p14:dur="700">
         <p:fade/>
       </p:transition>
     </mc:Choice>
-    <mc:Fallback>
+    <mc:Fallback xmlns="">
       <p:transition spd="med">
         <p:fade/>
       </p:transition>
@@ -15565,13 +15582,13 @@
   <p:clrMapOvr>
     <a:masterClrMapping/>
   </p:clrMapOvr>
-  <mc:AlternateContent xmlns:mc="http://schemas.openxmlformats.org/markup-compatibility/2006">
-    <mc:Choice xmlns:p14="http://schemas.microsoft.com/office/powerpoint/2010/main" Requires="p14">
+  <mc:AlternateContent xmlns:mc="http://schemas.openxmlformats.org/markup-compatibility/2006" xmlns:p14="http://schemas.microsoft.com/office/powerpoint/2010/main">
+    <mc:Choice Requires="p14">
       <p:transition spd="med" p14:dur="700">
         <p:fade/>
       </p:transition>
     </mc:Choice>
-    <mc:Fallback>
+    <mc:Fallback xmlns="">
       <p:transition spd="med">
         <p:fade/>
       </p:transition>

</xml_diff>